<commit_message>
Cosmetic changes, mostly for the home page and footer allignment
</commit_message>
<xml_diff>
--- a/website/static/files/images for website.pptx
+++ b/website/static/files/images for website.pptx
@@ -14,6 +14,8 @@
     <p:sldId id="261" r:id="rId8"/>
     <p:sldId id="263" r:id="rId9"/>
     <p:sldId id="265" r:id="rId10"/>
+    <p:sldId id="266" r:id="rId11"/>
+    <p:sldId id="267" r:id="rId12"/>
   </p:sldIdLst>
   <p:sldSz cx="12192000" cy="6858000"/>
   <p:notesSz cx="6858000" cy="9144000"/>
@@ -29596,7 +29598,7 @@
           <a:p>
             <a:fld id="{452A0076-6FA1-4F5A-8EAE-52E21E75B441}" type="datetimeFigureOut">
               <a:rPr lang="cs-CZ" smtClean="0"/>
-              <a:t>04.10.2024</a:t>
+              <a:t>23.12.2024</a:t>
             </a:fld>
             <a:endParaRPr lang="cs-CZ"/>
           </a:p>
@@ -29794,7 +29796,7 @@
           <a:p>
             <a:fld id="{452A0076-6FA1-4F5A-8EAE-52E21E75B441}" type="datetimeFigureOut">
               <a:rPr lang="cs-CZ" smtClean="0"/>
-              <a:t>04.10.2024</a:t>
+              <a:t>23.12.2024</a:t>
             </a:fld>
             <a:endParaRPr lang="cs-CZ"/>
           </a:p>
@@ -30002,7 +30004,7 @@
           <a:p>
             <a:fld id="{452A0076-6FA1-4F5A-8EAE-52E21E75B441}" type="datetimeFigureOut">
               <a:rPr lang="cs-CZ" smtClean="0"/>
-              <a:t>04.10.2024</a:t>
+              <a:t>23.12.2024</a:t>
             </a:fld>
             <a:endParaRPr lang="cs-CZ"/>
           </a:p>
@@ -30200,7 +30202,7 @@
           <a:p>
             <a:fld id="{452A0076-6FA1-4F5A-8EAE-52E21E75B441}" type="datetimeFigureOut">
               <a:rPr lang="cs-CZ" smtClean="0"/>
-              <a:t>04.10.2024</a:t>
+              <a:t>23.12.2024</a:t>
             </a:fld>
             <a:endParaRPr lang="cs-CZ"/>
           </a:p>
@@ -30475,7 +30477,7 @@
           <a:p>
             <a:fld id="{452A0076-6FA1-4F5A-8EAE-52E21E75B441}" type="datetimeFigureOut">
               <a:rPr lang="cs-CZ" smtClean="0"/>
-              <a:t>04.10.2024</a:t>
+              <a:t>23.12.2024</a:t>
             </a:fld>
             <a:endParaRPr lang="cs-CZ"/>
           </a:p>
@@ -30740,7 +30742,7 @@
           <a:p>
             <a:fld id="{452A0076-6FA1-4F5A-8EAE-52E21E75B441}" type="datetimeFigureOut">
               <a:rPr lang="cs-CZ" smtClean="0"/>
-              <a:t>04.10.2024</a:t>
+              <a:t>23.12.2024</a:t>
             </a:fld>
             <a:endParaRPr lang="cs-CZ"/>
           </a:p>
@@ -31152,7 +31154,7 @@
           <a:p>
             <a:fld id="{452A0076-6FA1-4F5A-8EAE-52E21E75B441}" type="datetimeFigureOut">
               <a:rPr lang="cs-CZ" smtClean="0"/>
-              <a:t>04.10.2024</a:t>
+              <a:t>23.12.2024</a:t>
             </a:fld>
             <a:endParaRPr lang="cs-CZ"/>
           </a:p>
@@ -31293,7 +31295,7 @@
           <a:p>
             <a:fld id="{452A0076-6FA1-4F5A-8EAE-52E21E75B441}" type="datetimeFigureOut">
               <a:rPr lang="cs-CZ" smtClean="0"/>
-              <a:t>04.10.2024</a:t>
+              <a:t>23.12.2024</a:t>
             </a:fld>
             <a:endParaRPr lang="cs-CZ"/>
           </a:p>
@@ -31406,7 +31408,7 @@
           <a:p>
             <a:fld id="{452A0076-6FA1-4F5A-8EAE-52E21E75B441}" type="datetimeFigureOut">
               <a:rPr lang="cs-CZ" smtClean="0"/>
-              <a:t>04.10.2024</a:t>
+              <a:t>23.12.2024</a:t>
             </a:fld>
             <a:endParaRPr lang="cs-CZ"/>
           </a:p>
@@ -31717,7 +31719,7 @@
           <a:p>
             <a:fld id="{452A0076-6FA1-4F5A-8EAE-52E21E75B441}" type="datetimeFigureOut">
               <a:rPr lang="cs-CZ" smtClean="0"/>
-              <a:t>04.10.2024</a:t>
+              <a:t>23.12.2024</a:t>
             </a:fld>
             <a:endParaRPr lang="cs-CZ"/>
           </a:p>
@@ -32005,7 +32007,7 @@
           <a:p>
             <a:fld id="{452A0076-6FA1-4F5A-8EAE-52E21E75B441}" type="datetimeFigureOut">
               <a:rPr lang="cs-CZ" smtClean="0"/>
-              <a:t>04.10.2024</a:t>
+              <a:t>23.12.2024</a:t>
             </a:fld>
             <a:endParaRPr lang="cs-CZ"/>
           </a:p>
@@ -32246,7 +32248,7 @@
           <a:p>
             <a:fld id="{452A0076-6FA1-4F5A-8EAE-52E21E75B441}" type="datetimeFigureOut">
               <a:rPr lang="cs-CZ" smtClean="0"/>
-              <a:t>04.10.2024</a:t>
+              <a:t>23.12.2024</a:t>
             </a:fld>
             <a:endParaRPr lang="cs-CZ"/>
           </a:p>
@@ -33418,6 +33420,202 @@
     <p:extLst>
       <p:ext uri="{BB962C8B-B14F-4D97-AF65-F5344CB8AC3E}">
         <p14:creationId xmlns:p14="http://schemas.microsoft.com/office/powerpoint/2010/main" val="786019658"/>
+      </p:ext>
+    </p:extLst>
+  </p:cSld>
+  <p:clrMapOvr>
+    <a:masterClrMapping/>
+  </p:clrMapOvr>
+</p:sld>
+</file>
+
+<file path=ppt/slides/slide10.xml><?xml version="1.0" encoding="utf-8"?>
+<p:sld xmlns:a="http://schemas.openxmlformats.org/drawingml/2006/main" xmlns:r="http://schemas.openxmlformats.org/officeDocument/2006/relationships" xmlns:p="http://schemas.openxmlformats.org/presentationml/2006/main">
+  <p:cSld>
+    <p:bg>
+      <p:bgPr>
+        <a:solidFill>
+          <a:schemeClr val="tx1">
+            <a:lumMod val="50000"/>
+            <a:lumOff val="50000"/>
+          </a:schemeClr>
+        </a:solidFill>
+        <a:effectLst/>
+      </p:bgPr>
+    </p:bg>
+    <p:spTree>
+      <p:nvGrpSpPr>
+        <p:cNvPr id="1" name=""/>
+        <p:cNvGrpSpPr/>
+        <p:nvPr/>
+      </p:nvGrpSpPr>
+      <p:grpSpPr>
+        <a:xfrm>
+          <a:off x="0" y="0"/>
+          <a:ext cx="0" cy="0"/>
+          <a:chOff x="0" y="0"/>
+          <a:chExt cx="0" cy="0"/>
+        </a:xfrm>
+      </p:grpSpPr>
+      <p:pic>
+        <p:nvPicPr>
+          <p:cNvPr id="17" name="Grafický objekt 16">
+            <a:extLst>
+              <a:ext uri="{FF2B5EF4-FFF2-40B4-BE49-F238E27FC236}">
+                <a16:creationId xmlns:a16="http://schemas.microsoft.com/office/drawing/2014/main" id="{CC8055E2-0DA0-4FF6-A4EA-3BB5F7CA18E1}"/>
+              </a:ext>
+            </a:extLst>
+          </p:cNvPr>
+          <p:cNvPicPr>
+            <a:picLocks noChangeAspect="1"/>
+          </p:cNvPicPr>
+          <p:nvPr/>
+        </p:nvPicPr>
+        <p:blipFill>
+          <a:blip r:embed="rId2">
+            <a:extLst>
+              <a:ext uri="{96DAC541-7B7A-43D3-8B79-37D633B846F1}">
+                <asvg:svgBlip xmlns:asvg="http://schemas.microsoft.com/office/drawing/2016/SVG/main" r:embed="rId3"/>
+              </a:ext>
+            </a:extLst>
+          </a:blip>
+          <a:stretch>
+            <a:fillRect/>
+          </a:stretch>
+        </p:blipFill>
+        <p:spPr>
+          <a:xfrm>
+            <a:off x="2667000" y="1127961"/>
+            <a:ext cx="6858001" cy="4602079"/>
+          </a:xfrm>
+          <a:prstGeom prst="rect">
+            <a:avLst/>
+          </a:prstGeom>
+        </p:spPr>
+      </p:pic>
+    </p:spTree>
+    <p:extLst>
+      <p:ext uri="{BB962C8B-B14F-4D97-AF65-F5344CB8AC3E}">
+        <p14:creationId xmlns:p14="http://schemas.microsoft.com/office/powerpoint/2010/main" val="3384069047"/>
+      </p:ext>
+    </p:extLst>
+  </p:cSld>
+  <p:clrMapOvr>
+    <a:masterClrMapping/>
+  </p:clrMapOvr>
+</p:sld>
+</file>
+
+<file path=ppt/slides/slide11.xml><?xml version="1.0" encoding="utf-8"?>
+<p:sld xmlns:a="http://schemas.openxmlformats.org/drawingml/2006/main" xmlns:r="http://schemas.openxmlformats.org/officeDocument/2006/relationships" xmlns:p="http://schemas.openxmlformats.org/presentationml/2006/main">
+  <p:cSld>
+    <p:spTree>
+      <p:nvGrpSpPr>
+        <p:cNvPr id="1" name=""/>
+        <p:cNvGrpSpPr/>
+        <p:nvPr/>
+      </p:nvGrpSpPr>
+      <p:grpSpPr>
+        <a:xfrm>
+          <a:off x="0" y="0"/>
+          <a:ext cx="0" cy="0"/>
+          <a:chOff x="0" y="0"/>
+          <a:chExt cx="0" cy="0"/>
+        </a:xfrm>
+      </p:grpSpPr>
+      <p:pic>
+        <p:nvPicPr>
+          <p:cNvPr id="4" name="Obrázek 3">
+            <a:extLst>
+              <a:ext uri="{FF2B5EF4-FFF2-40B4-BE49-F238E27FC236}">
+                <a16:creationId xmlns:a16="http://schemas.microsoft.com/office/drawing/2014/main" id="{CC1B3E29-3474-4C5A-A449-D70F5B2E47DE}"/>
+              </a:ext>
+            </a:extLst>
+          </p:cNvPr>
+          <p:cNvPicPr>
+            <a:picLocks noChangeAspect="1"/>
+          </p:cNvPicPr>
+          <p:nvPr/>
+        </p:nvPicPr>
+        <p:blipFill>
+          <a:blip r:embed="rId2"/>
+          <a:stretch>
+            <a:fillRect/>
+          </a:stretch>
+        </p:blipFill>
+        <p:spPr>
+          <a:xfrm>
+            <a:off x="2689460" y="622080"/>
+            <a:ext cx="6835541" cy="5632345"/>
+          </a:xfrm>
+          <a:prstGeom prst="rect">
+            <a:avLst/>
+          </a:prstGeom>
+        </p:spPr>
+      </p:pic>
+      <p:sp>
+        <p:nvSpPr>
+          <p:cNvPr id="5" name="Obdélník 4">
+            <a:extLst>
+              <a:ext uri="{FF2B5EF4-FFF2-40B4-BE49-F238E27FC236}">
+                <a16:creationId xmlns:a16="http://schemas.microsoft.com/office/drawing/2014/main" id="{C41666B4-74EC-43EE-BBC3-837C99E93F0E}"/>
+              </a:ext>
+            </a:extLst>
+          </p:cNvPr>
+          <p:cNvSpPr/>
+          <p:nvPr/>
+        </p:nvSpPr>
+        <p:spPr>
+          <a:xfrm>
+            <a:off x="3582840" y="2583360"/>
+            <a:ext cx="1140480" cy="1641600"/>
+          </a:xfrm>
+          <a:prstGeom prst="rect">
+            <a:avLst/>
+          </a:prstGeom>
+          <a:solidFill>
+            <a:schemeClr val="bg1"/>
+          </a:solidFill>
+          <a:ln>
+            <a:solidFill>
+              <a:schemeClr val="bg1"/>
+            </a:solidFill>
+          </a:ln>
+        </p:spPr>
+        <p:style>
+          <a:lnRef idx="2">
+            <a:schemeClr val="accent1">
+              <a:shade val="50000"/>
+            </a:schemeClr>
+          </a:lnRef>
+          <a:fillRef idx="1">
+            <a:schemeClr val="accent1"/>
+          </a:fillRef>
+          <a:effectRef idx="0">
+            <a:schemeClr val="accent1"/>
+          </a:effectRef>
+          <a:fontRef idx="minor">
+            <a:schemeClr val="lt1"/>
+          </a:fontRef>
+        </p:style>
+        <p:txBody>
+          <a:bodyPr rot="0" spcFirstLastPara="0" vertOverflow="overflow" horzOverflow="overflow" vert="horz" wrap="square" lIns="124416" tIns="62208" rIns="124416" bIns="62208" numCol="1" spcCol="0" rtlCol="0" fromWordArt="0" anchor="ctr" anchorCtr="0" forceAA="0" compatLnSpc="1">
+            <a:prstTxWarp prst="textNoShape">
+              <a:avLst/>
+            </a:prstTxWarp>
+            <a:noAutofit/>
+          </a:bodyPr>
+          <a:lstStyle/>
+          <a:p>
+            <a:pPr algn="ctr"/>
+            <a:endParaRPr lang="cs-CZ" sz="2449"/>
+          </a:p>
+        </p:txBody>
+      </p:sp>
+    </p:spTree>
+    <p:extLst>
+      <p:ext uri="{BB962C8B-B14F-4D97-AF65-F5344CB8AC3E}">
+        <p14:creationId xmlns:p14="http://schemas.microsoft.com/office/powerpoint/2010/main" val="3537452828"/>
       </p:ext>
     </p:extLst>
   </p:cSld>

</xml_diff>